<commit_message>
Minor changes to index.html
</commit_message>
<xml_diff>
--- a/PPT/Presentation.ppt.pptx
+++ b/PPT/Presentation.ppt.pptx
@@ -1097,6 +1097,13 @@
         </dgm:presLayoutVars>
       </dgm:prSet>
       <dgm:spPr/>
+      <dgm:t>
+        <a:bodyPr/>
+        <a:lstStyle/>
+        <a:p>
+          <a:endParaRPr lang="en-US"/>
+        </a:p>
+      </dgm:t>
     </dgm:pt>
     <dgm:pt modelId="{AF35626A-E8A6-43E1-BB8B-0A6CECAEDE45}" type="pres">
       <dgm:prSet presAssocID="{018C559D-C910-40BE-BC4E-D01AF2743E33}" presName="thickLine" presStyleLbl="alignNode1" presStyleIdx="0" presStyleCnt="1"/>
@@ -1109,6 +1116,13 @@
     <dgm:pt modelId="{F9001BFB-65F4-45BB-88F2-C3A6A75824BD}" type="pres">
       <dgm:prSet presAssocID="{018C559D-C910-40BE-BC4E-D01AF2743E33}" presName="tx1" presStyleLbl="revTx" presStyleIdx="0" presStyleCnt="4"/>
       <dgm:spPr/>
+      <dgm:t>
+        <a:bodyPr/>
+        <a:lstStyle/>
+        <a:p>
+          <a:endParaRPr lang="en-US"/>
+        </a:p>
+      </dgm:t>
     </dgm:pt>
     <dgm:pt modelId="{D4C85C15-8886-428A-A285-B627ED4A399A}" type="pres">
       <dgm:prSet presAssocID="{018C559D-C910-40BE-BC4E-D01AF2743E33}" presName="vert1" presStyleCnt="0"/>
@@ -1213,15 +1227,15 @@
     </dgm:pt>
   </dgm:ptLst>
   <dgm:cxnLst>
-    <dgm:cxn modelId="{6CFC974D-4382-4440-955E-F81B167F96E5}" type="presOf" srcId="{DFC79F4B-AF53-47C3-9C97-B4B23EE68A18}" destId="{927D4A44-A953-41E9-AE36-E0FE08356D3D}" srcOrd="0" destOrd="0" presId="urn:microsoft.com/office/officeart/2008/layout/LinedList"/>
+    <dgm:cxn modelId="{EE1B87B6-75B9-4D80-8CE8-A197BAFEDCDC}" srcId="{018C559D-C910-40BE-BC4E-D01AF2743E33}" destId="{1FBA0DE7-C591-4553-9DFB-CC7597395A14}" srcOrd="2" destOrd="0" parTransId="{7D27E71C-E367-48D3-A4BC-DB07FED03890}" sibTransId="{6CB77DA6-1F41-4B39-BB10-71C826268F3A}"/>
+    <dgm:cxn modelId="{1159A856-6585-40E6-84B9-1EFCB23C1412}" type="presOf" srcId="{018C559D-C910-40BE-BC4E-D01AF2743E33}" destId="{F9001BFB-65F4-45BB-88F2-C3A6A75824BD}" srcOrd="0" destOrd="0" presId="urn:microsoft.com/office/officeart/2008/layout/LinedList"/>
     <dgm:cxn modelId="{51D15D95-AEE7-41E7-925F-FEF87A9469D0}" type="presOf" srcId="{35542362-BB51-426F-BCAE-DB01D808D8F1}" destId="{4365A011-FE35-44A3-BDD8-9778B9BBCCC3}" srcOrd="0" destOrd="0" presId="urn:microsoft.com/office/officeart/2008/layout/LinedList"/>
     <dgm:cxn modelId="{A57F3845-FA87-4CAD-8D64-3942414345B4}" srcId="{35542362-BB51-426F-BCAE-DB01D808D8F1}" destId="{018C559D-C910-40BE-BC4E-D01AF2743E33}" srcOrd="0" destOrd="0" parTransId="{BD043434-58A7-49E8-85A1-376900F53515}" sibTransId="{D1497C44-F3C2-461C-BF64-CD5D5EB8E1BB}"/>
-    <dgm:cxn modelId="{EE1B87B6-75B9-4D80-8CE8-A197BAFEDCDC}" srcId="{018C559D-C910-40BE-BC4E-D01AF2743E33}" destId="{1FBA0DE7-C591-4553-9DFB-CC7597395A14}" srcOrd="2" destOrd="0" parTransId="{7D27E71C-E367-48D3-A4BC-DB07FED03890}" sibTransId="{6CB77DA6-1F41-4B39-BB10-71C826268F3A}"/>
+    <dgm:cxn modelId="{6CFC974D-4382-4440-955E-F81B167F96E5}" type="presOf" srcId="{DFC79F4B-AF53-47C3-9C97-B4B23EE68A18}" destId="{927D4A44-A953-41E9-AE36-E0FE08356D3D}" srcOrd="0" destOrd="0" presId="urn:microsoft.com/office/officeart/2008/layout/LinedList"/>
     <dgm:cxn modelId="{55010EBA-30E1-4795-A9C5-501DB50DEA78}" type="presOf" srcId="{993D4818-00C1-42C6-8EB7-C20F7CB86982}" destId="{01E41227-73FD-40E9-B136-BDE8A5B00073}" srcOrd="0" destOrd="0" presId="urn:microsoft.com/office/officeart/2008/layout/LinedList"/>
+    <dgm:cxn modelId="{9B29DFFD-FE1D-4772-B44D-8D98685516CE}" srcId="{018C559D-C910-40BE-BC4E-D01AF2743E33}" destId="{DFC79F4B-AF53-47C3-9C97-B4B23EE68A18}" srcOrd="1" destOrd="0" parTransId="{424FC287-694D-4116-9FF3-96FC4BF791CD}" sibTransId="{3E08433F-B2D0-45CD-8FFF-EAF17504289C}"/>
     <dgm:cxn modelId="{0352868D-8B19-466F-B915-1CAD9280F3C3}" type="presOf" srcId="{1FBA0DE7-C591-4553-9DFB-CC7597395A14}" destId="{2D309A9E-08CD-4F59-A85C-6399A2778EF4}" srcOrd="0" destOrd="0" presId="urn:microsoft.com/office/officeart/2008/layout/LinedList"/>
     <dgm:cxn modelId="{2C699A98-DDBD-49B0-B144-F07B5BFEC8F0}" srcId="{018C559D-C910-40BE-BC4E-D01AF2743E33}" destId="{993D4818-00C1-42C6-8EB7-C20F7CB86982}" srcOrd="0" destOrd="0" parTransId="{D2C95D1D-4141-43EE-8120-3BA533E83970}" sibTransId="{AA73DF5D-49DD-44E1-81FE-1CAE878F6D8E}"/>
-    <dgm:cxn modelId="{9B29DFFD-FE1D-4772-B44D-8D98685516CE}" srcId="{018C559D-C910-40BE-BC4E-D01AF2743E33}" destId="{DFC79F4B-AF53-47C3-9C97-B4B23EE68A18}" srcOrd="1" destOrd="0" parTransId="{424FC287-694D-4116-9FF3-96FC4BF791CD}" sibTransId="{3E08433F-B2D0-45CD-8FFF-EAF17504289C}"/>
-    <dgm:cxn modelId="{1159A856-6585-40E6-84B9-1EFCB23C1412}" type="presOf" srcId="{018C559D-C910-40BE-BC4E-D01AF2743E33}" destId="{F9001BFB-65F4-45BB-88F2-C3A6A75824BD}" srcOrd="0" destOrd="0" presId="urn:microsoft.com/office/officeart/2008/layout/LinedList"/>
     <dgm:cxn modelId="{EFEC5896-A8ED-4AF6-B809-D3BC2C9669E6}" type="presParOf" srcId="{4365A011-FE35-44A3-BDD8-9778B9BBCCC3}" destId="{AF35626A-E8A6-43E1-BB8B-0A6CECAEDE45}" srcOrd="0" destOrd="0" presId="urn:microsoft.com/office/officeart/2008/layout/LinedList"/>
     <dgm:cxn modelId="{49E29B1F-2244-4860-B52D-40D7755E76CF}" type="presParOf" srcId="{4365A011-FE35-44A3-BDD8-9778B9BBCCC3}" destId="{C9B70F85-35E3-4233-A33A-B13FEEB189AC}" srcOrd="1" destOrd="0" presId="urn:microsoft.com/office/officeart/2008/layout/LinedList"/>
     <dgm:cxn modelId="{23066B63-A15D-4220-AFB7-E76126430944}" type="presParOf" srcId="{C9B70F85-35E3-4233-A33A-B13FEEB189AC}" destId="{F9001BFB-65F4-45BB-88F2-C3A6A75824BD}" srcOrd="0" destOrd="0" presId="urn:microsoft.com/office/officeart/2008/layout/LinedList"/>
@@ -6879,7 +6893,7 @@
         </p:nvGrpSpPr>
         <p:grpSpPr>
           <a:xfrm>
-            <a:off x="2064327" y="329378"/>
+            <a:off x="1905000" y="837097"/>
             <a:ext cx="6851072" cy="533400"/>
             <a:chOff x="2133600" y="523101"/>
             <a:chExt cx="4876800" cy="533400"/>
@@ -6978,7 +6992,7 @@
         </p:nvGrpSpPr>
         <p:grpSpPr>
           <a:xfrm>
-            <a:off x="2164197" y="2729701"/>
+            <a:off x="2004870" y="3237420"/>
             <a:ext cx="6446402" cy="552361"/>
             <a:chOff x="2146234" y="2367665"/>
             <a:chExt cx="4864166" cy="627010"/>
@@ -7077,7 +7091,7 @@
         </p:nvGrpSpPr>
         <p:grpSpPr>
           <a:xfrm>
-            <a:off x="2147454" y="1836952"/>
+            <a:off x="1988127" y="2344671"/>
             <a:ext cx="6463147" cy="711037"/>
             <a:chOff x="2147454" y="4017727"/>
             <a:chExt cx="5334000" cy="407964"/>
@@ -7176,7 +7190,7 @@
         </p:nvGrpSpPr>
         <p:grpSpPr>
           <a:xfrm>
-            <a:off x="2147453" y="3476988"/>
+            <a:off x="1988126" y="3984707"/>
             <a:ext cx="6463145" cy="818432"/>
             <a:chOff x="2147454" y="3359129"/>
             <a:chExt cx="5334000" cy="520820"/>
@@ -7275,7 +7289,7 @@
         </p:nvSpPr>
         <p:spPr>
           <a:xfrm>
-            <a:off x="2178895" y="4410759"/>
+            <a:off x="2019568" y="4918478"/>
             <a:ext cx="1524000" cy="1622941"/>
           </a:xfrm>
           <a:prstGeom prst="rect">
@@ -7319,7 +7333,7 @@
         </p:nvSpPr>
         <p:spPr>
           <a:xfrm>
-            <a:off x="2191514" y="5712023"/>
+            <a:off x="2032187" y="6219742"/>
             <a:ext cx="1511381" cy="307777"/>
           </a:xfrm>
           <a:prstGeom prst="rect">
@@ -7364,7 +7378,7 @@
         </p:blipFill>
         <p:spPr bwMode="auto">
           <a:xfrm>
-            <a:off x="2449012" y="4519265"/>
+            <a:off x="2289685" y="5026984"/>
             <a:ext cx="983765" cy="1172270"/>
           </a:xfrm>
           <a:prstGeom prst="rect">
@@ -7390,7 +7404,7 @@
         </p:nvSpPr>
         <p:spPr>
           <a:xfrm>
-            <a:off x="4081917" y="4410759"/>
+            <a:off x="3922590" y="4918478"/>
             <a:ext cx="4528681" cy="1622941"/>
           </a:xfrm>
           <a:prstGeom prst="rect">
@@ -7449,7 +7463,7 @@
         </p:blipFill>
         <p:spPr bwMode="auto">
           <a:xfrm>
-            <a:off x="5250750" y="4519265"/>
+            <a:off x="5091423" y="5026984"/>
             <a:ext cx="1531049" cy="1451087"/>
           </a:xfrm>
           <a:prstGeom prst="rect">
@@ -7475,7 +7489,7 @@
         </p:nvSpPr>
         <p:spPr>
           <a:xfrm>
-            <a:off x="7353776" y="4539540"/>
+            <a:off x="7194449" y="5047259"/>
             <a:ext cx="1136074" cy="338554"/>
           </a:xfrm>
           <a:prstGeom prst="rect">
@@ -7514,7 +7528,7 @@
         </p:nvCxnSpPr>
         <p:spPr>
           <a:xfrm flipH="1" flipV="1">
-            <a:off x="3547024" y="5381578"/>
+            <a:off x="3387697" y="5889297"/>
             <a:ext cx="1437363" cy="1"/>
           </a:xfrm>
           <a:prstGeom prst="straightConnector1">
@@ -7547,7 +7561,7 @@
         </p:nvCxnSpPr>
         <p:spPr>
           <a:xfrm>
-            <a:off x="2940895" y="880975"/>
+            <a:off x="2781568" y="1388694"/>
             <a:ext cx="0" cy="734199"/>
           </a:xfrm>
           <a:prstGeom prst="straightConnector1">
@@ -7586,7 +7600,7 @@
         </p:nvCxnSpPr>
         <p:spPr>
           <a:xfrm>
-            <a:off x="4277078" y="898595"/>
+            <a:off x="4117751" y="1406314"/>
             <a:ext cx="0" cy="734199"/>
           </a:xfrm>
           <a:prstGeom prst="straightConnector1">
@@ -7625,7 +7639,7 @@
         </p:nvCxnSpPr>
         <p:spPr>
           <a:xfrm>
-            <a:off x="5552563" y="885235"/>
+            <a:off x="5393236" y="1392954"/>
             <a:ext cx="0" cy="734199"/>
           </a:xfrm>
           <a:prstGeom prst="straightConnector1">
@@ -7664,7 +7678,7 @@
         </p:nvSpPr>
         <p:spPr>
           <a:xfrm>
-            <a:off x="2604131" y="867613"/>
+            <a:off x="2444804" y="1375332"/>
             <a:ext cx="301813" cy="769441"/>
           </a:xfrm>
           <a:prstGeom prst="rect">
@@ -7742,7 +7756,7 @@
         </p:nvSpPr>
         <p:spPr>
           <a:xfrm>
-            <a:off x="3902345" y="845733"/>
+            <a:off x="3743018" y="1353452"/>
             <a:ext cx="363360" cy="769441"/>
           </a:xfrm>
           <a:prstGeom prst="rect">
@@ -7820,7 +7834,7 @@
         </p:nvSpPr>
         <p:spPr>
           <a:xfrm>
-            <a:off x="5250750" y="849993"/>
+            <a:off x="5091423" y="1357712"/>
             <a:ext cx="301813" cy="769441"/>
           </a:xfrm>
           <a:prstGeom prst="rect">
@@ -7898,7 +7912,7 @@
         </p:nvSpPr>
         <p:spPr>
           <a:xfrm>
-            <a:off x="407777" y="1752600"/>
+            <a:off x="248450" y="2260319"/>
             <a:ext cx="1586345" cy="4267200"/>
           </a:xfrm>
           <a:prstGeom prst="roundRect">
@@ -7939,7 +7953,7 @@
         </p:nvSpPr>
         <p:spPr>
           <a:xfrm>
-            <a:off x="540327" y="1780401"/>
+            <a:off x="381000" y="2288120"/>
             <a:ext cx="1524000" cy="369332"/>
           </a:xfrm>
           <a:prstGeom prst="rect">
@@ -7986,7 +8000,7 @@
         </p:nvSpPr>
         <p:spPr>
           <a:xfrm>
-            <a:off x="540327" y="2622331"/>
+            <a:off x="381000" y="3130050"/>
             <a:ext cx="1364673" cy="552360"/>
           </a:xfrm>
           <a:prstGeom prst="round2DiagRect">
@@ -8028,7 +8042,7 @@
         </p:nvSpPr>
         <p:spPr>
           <a:xfrm>
-            <a:off x="540327" y="3858399"/>
+            <a:off x="381000" y="4366118"/>
             <a:ext cx="1364673" cy="552360"/>
           </a:xfrm>
           <a:prstGeom prst="round2DiagRect">
@@ -8070,7 +8084,7 @@
         </p:nvSpPr>
         <p:spPr>
           <a:xfrm>
-            <a:off x="576047" y="5105400"/>
+            <a:off x="416720" y="5613119"/>
             <a:ext cx="1364673" cy="552360"/>
           </a:xfrm>
           <a:prstGeom prst="round2DiagRect">
@@ -8112,7 +8126,7 @@
         </p:nvSpPr>
         <p:spPr>
           <a:xfrm>
-            <a:off x="2064328" y="1637054"/>
+            <a:off x="1905001" y="2144773"/>
             <a:ext cx="6851072" cy="4710004"/>
           </a:xfrm>
           <a:prstGeom prst="rect">
@@ -8161,7 +8175,7 @@
         </p:nvSpPr>
         <p:spPr>
           <a:xfrm>
-            <a:off x="6622151" y="845732"/>
+            <a:off x="6462824" y="1353451"/>
             <a:ext cx="301813" cy="769441"/>
           </a:xfrm>
           <a:prstGeom prst="rect">
@@ -8239,7 +8253,7 @@
         </p:nvCxnSpPr>
         <p:spPr>
           <a:xfrm>
-            <a:off x="6934200" y="867613"/>
+            <a:off x="6774873" y="1375332"/>
             <a:ext cx="0" cy="734199"/>
           </a:xfrm>
           <a:prstGeom prst="straightConnector1">
@@ -8278,7 +8292,7 @@
         </p:nvCxnSpPr>
         <p:spPr>
           <a:xfrm>
-            <a:off x="8229600" y="862778"/>
+            <a:off x="8070273" y="1370497"/>
             <a:ext cx="0" cy="734199"/>
           </a:xfrm>
           <a:prstGeom prst="straightConnector1">
@@ -8317,7 +8331,7 @@
         </p:nvSpPr>
         <p:spPr>
           <a:xfrm>
-            <a:off x="7907848" y="867613"/>
+            <a:off x="7748521" y="1375332"/>
             <a:ext cx="301813" cy="769441"/>
           </a:xfrm>
           <a:prstGeom prst="rect">
@@ -8384,6 +8398,37 @@
                 </a:schemeClr>
               </a:solidFill>
             </a:endParaRPr>
+          </a:p>
+        </p:txBody>
+      </p:sp>
+      <p:sp>
+        <p:nvSpPr>
+          <p:cNvPr id="16" name="TextBox 15"/>
+          <p:cNvSpPr txBox="1"/>
+          <p:nvPr/>
+        </p:nvSpPr>
+        <p:spPr>
+          <a:xfrm>
+            <a:off x="3387697" y="56634"/>
+            <a:ext cx="2275948" cy="707886"/>
+          </a:xfrm>
+          <a:prstGeom prst="rect">
+            <a:avLst/>
+          </a:prstGeom>
+          <a:noFill/>
+        </p:spPr>
+        <p:txBody>
+          <a:bodyPr wrap="square" rtlCol="0">
+            <a:spAutoFit/>
+          </a:bodyPr>
+          <a:lstStyle/>
+          <a:p>
+            <a:pPr algn="ctr"/>
+            <a:r>
+              <a:rPr lang="en-US" sz="4000" dirty="0" smtClean="0"/>
+              <a:t>LAYERS</a:t>
+            </a:r>
+            <a:endParaRPr lang="en-US" sz="4000" dirty="0"/>
           </a:p>
         </p:txBody>
       </p:sp>
@@ -8456,6 +8501,13 @@
   <p:clrMapOvr>
     <a:masterClrMapping/>
   </p:clrMapOvr>
+  <p:timing>
+    <p:tnLst>
+      <p:par>
+        <p:cTn id="1" dur="indefinite" restart="never" nodeType="tmRoot"/>
+      </p:par>
+    </p:tnLst>
+  </p:timing>
 </p:sld>
 </file>
 

</xml_diff>